<commit_message>
Update the usermanual to add the params in DB generation tab
</commit_message>
<xml_diff>
--- a/Documents/UserManual.pptx
+++ b/Documents/UserManual.pptx
@@ -2973,6 +2973,36 @@
       </p:grpSpPr>
       <p:pic>
         <p:nvPicPr>
+          <p:cNvPr id="8" name="Picture 7">
+            <a:extLst>
+              <a:ext uri="{FF2B5EF4-FFF2-40B4-BE49-F238E27FC236}">
+                <a16:creationId xmlns:a16="http://schemas.microsoft.com/office/drawing/2014/main" id="{19349EC7-0D50-4510-92B7-D1FD6D52C61C}"/>
+              </a:ext>
+            </a:extLst>
+          </p:cNvPr>
+          <p:cNvPicPr>
+            <a:picLocks noChangeAspect="1"/>
+          </p:cNvPicPr>
+          <p:nvPr/>
+        </p:nvPicPr>
+        <p:blipFill>
+          <a:blip r:embed="rId2"/>
+          <a:stretch>
+            <a:fillRect/>
+          </a:stretch>
+        </p:blipFill>
+        <p:spPr>
+          <a:xfrm>
+            <a:off x="771389" y="16946058"/>
+            <a:ext cx="4249316" cy="4267580"/>
+          </a:xfrm>
+          <a:prstGeom prst="rect">
+            <a:avLst/>
+          </a:prstGeom>
+        </p:spPr>
+      </p:pic>
+      <p:pic>
+        <p:nvPicPr>
           <p:cNvPr id="33" name="Picture 32">
             <a:extLst>
               <a:ext uri="{FF2B5EF4-FFF2-40B4-BE49-F238E27FC236}">
@@ -2986,7 +3016,7 @@
           <p:nvPr/>
         </p:nvPicPr>
         <p:blipFill>
-          <a:blip r:embed="rId2"/>
+          <a:blip r:embed="rId3"/>
           <a:stretch>
             <a:fillRect/>
           </a:stretch>
@@ -3016,36 +3046,6 @@
           <p:nvPr/>
         </p:nvPicPr>
         <p:blipFill>
-          <a:blip r:embed="rId3"/>
-          <a:stretch>
-            <a:fillRect/>
-          </a:stretch>
-        </p:blipFill>
-        <p:spPr>
-          <a:xfrm>
-            <a:off x="6748881" y="11234761"/>
-            <a:ext cx="4468755" cy="4456562"/>
-          </a:xfrm>
-          <a:prstGeom prst="rect">
-            <a:avLst/>
-          </a:prstGeom>
-        </p:spPr>
-      </p:pic>
-      <p:pic>
-        <p:nvPicPr>
-          <p:cNvPr id="22" name="Picture 21">
-            <a:extLst>
-              <a:ext uri="{FF2B5EF4-FFF2-40B4-BE49-F238E27FC236}">
-                <a16:creationId xmlns:a16="http://schemas.microsoft.com/office/drawing/2014/main" id="{D995BD4F-AA4D-3C64-A33B-96F5CC84E39D}"/>
-              </a:ext>
-            </a:extLst>
-          </p:cNvPr>
-          <p:cNvPicPr>
-            <a:picLocks noChangeAspect="1"/>
-          </p:cNvPicPr>
-          <p:nvPr/>
-        </p:nvPicPr>
-        <p:blipFill>
           <a:blip r:embed="rId4"/>
           <a:stretch>
             <a:fillRect/>
@@ -3053,7 +3053,7 @@
         </p:blipFill>
         <p:spPr>
           <a:xfrm>
-            <a:off x="642294" y="16783672"/>
+            <a:off x="6774942" y="10899594"/>
             <a:ext cx="4468755" cy="4456562"/>
           </a:xfrm>
           <a:prstGeom prst="rect">
@@ -3342,8 +3342,8 @@
         </p:nvSpPr>
         <p:spPr>
           <a:xfrm>
-            <a:off x="5895018" y="6578990"/>
-            <a:ext cx="3683078" cy="830997"/>
+            <a:off x="5828722" y="6475258"/>
+            <a:ext cx="5672398" cy="584775"/>
           </a:xfrm>
           <a:prstGeom prst="rect">
             <a:avLst/>
@@ -3390,8 +3390,8 @@
         </p:nvSpPr>
         <p:spPr>
           <a:xfrm>
-            <a:off x="5802423" y="7652224"/>
-            <a:ext cx="6072570" cy="3539430"/>
+            <a:off x="5815215" y="7226773"/>
+            <a:ext cx="6072570" cy="3785652"/>
           </a:xfrm>
           <a:prstGeom prst="rect">
             <a:avLst/>
@@ -3407,7 +3407,7 @@
             <a:pPr algn="just"/>
             <a:r>
               <a:rPr lang="en-US" sz="1600" dirty="0"/>
-              <a:t>First select </a:t>
+              <a:t>First, select </a:t>
             </a:r>
             <a:r>
               <a:rPr lang="en-US" sz="1600" u="sng" dirty="0"/>
@@ -3426,7 +3426,7 @@
             </a:r>
             <a:r>
               <a:rPr lang="en-US" sz="1600" dirty="0"/>
-              <a:t>if you want to directly download a database file from a git repository, you may enter its address here. Then, by clicking on </a:t>
+              <a:t>if you want to download a database file from a git repository directly, you may enter its address here. Then, by clicking on </a:t>
             </a:r>
             <a:r>
               <a:rPr lang="en-US" sz="1600" u="sng" dirty="0"/>
@@ -3434,14 +3434,22 @@
             </a:r>
             <a:r>
               <a:rPr lang="en-US" sz="1600" dirty="0"/>
-              <a:t>, the csv database will be downloaded to cache directory.</a:t>
+              <a:t>, the CSV database will be downloaded to the cache directory.</a:t>
             </a:r>
           </a:p>
           <a:p>
             <a:pPr algn="just"/>
             <a:r>
+              <a:rPr lang="en-US" sz="1600" b="1" dirty="0">
+                <a:solidFill>
+                  <a:srgbClr val="FF0000"/>
+                </a:solidFill>
+              </a:rPr>
+              <a:t>Hint: </a:t>
+            </a:r>
+            <a:r>
               <a:rPr lang="en-US" sz="1600" dirty="0"/>
-              <a:t>Hint: The repo maintainer must provide this path and upload the csv file to its GitHub.</a:t>
+              <a:t>The repo maintainer must provide this path and upload the CSV file to its GitHub.</a:t>
             </a:r>
           </a:p>
           <a:p>
@@ -3452,15 +3460,7 @@
             </a:r>
             <a:r>
               <a:rPr lang="en-US" sz="1600" dirty="0"/>
-              <a:t>Select the database .csv file. This files contains all necessary information to search and download from a </a:t>
-            </a:r>
-            <a:r>
-              <a:rPr lang="en-US" sz="1600" dirty="0" err="1"/>
-              <a:t>Github</a:t>
-            </a:r>
-            <a:r>
-              <a:rPr lang="en-US" sz="1600" dirty="0"/>
-              <a:t> repository. </a:t>
+              <a:t>Select the database .csv file. This file contains all the necessary information to search and download from a GitHub repository. </a:t>
             </a:r>
           </a:p>
           <a:p>
@@ -3497,7 +3497,7 @@
             </a:r>
             <a:r>
               <a:rPr lang="en-US" sz="1600" dirty="0"/>
-              <a:t>, the library first copied from Cache directory to this path, then it will be installed on Altium</a:t>
+              <a:t>, the library is first copied from the Cache directory to this path, and then it will be installed on Altium</a:t>
             </a:r>
           </a:p>
         </p:txBody>
@@ -3561,7 +3561,7 @@
         <p:spPr>
           <a:xfrm>
             <a:off x="752494" y="14791570"/>
-            <a:ext cx="4690626" cy="1569660"/>
+            <a:ext cx="4358555" cy="1815882"/>
           </a:xfrm>
           <a:prstGeom prst="rect">
             <a:avLst/>
@@ -3635,8 +3635,8 @@
         </p:nvSpPr>
         <p:spPr>
           <a:xfrm>
-            <a:off x="5849027" y="15765610"/>
-            <a:ext cx="6072569" cy="5509200"/>
+            <a:off x="5881567" y="15314476"/>
+            <a:ext cx="6072569" cy="6001643"/>
           </a:xfrm>
           <a:prstGeom prst="rect">
             <a:avLst/>
@@ -3652,15 +3652,7 @@
             <a:pPr algn="just"/>
             <a:r>
               <a:rPr lang="en-US" sz="1600" dirty="0"/>
-              <a:t>If you want to create your own csv data base with your libraries and place them on </a:t>
-            </a:r>
-            <a:r>
-              <a:rPr lang="en-US" sz="1600" dirty="0" err="1"/>
-              <a:t>Github</a:t>
-            </a:r>
-            <a:r>
-              <a:rPr lang="en-US" sz="1600" dirty="0"/>
-              <a:t>, you may need to generate a DB file.</a:t>
+              <a:t>If you want to create your CSV database with your libraries and place them on GitHub, you may need to generate a DB file.</a:t>
             </a:r>
           </a:p>
           <a:p>
@@ -3671,23 +3663,7 @@
             </a:r>
             <a:r>
               <a:rPr lang="en-US" sz="1600" dirty="0"/>
-              <a:t>This directory on your PC, should contain the root of all your libraries that are in </a:t>
-            </a:r>
-            <a:r>
-              <a:rPr lang="en-US" sz="1600" dirty="0" err="1"/>
-              <a:t>Github</a:t>
-            </a:r>
-            <a:r>
-              <a:rPr lang="en-US" sz="1600" dirty="0"/>
-              <a:t>. The root should be the same as what is available on your </a:t>
-            </a:r>
-            <a:r>
-              <a:rPr lang="en-US" sz="1600" dirty="0" err="1"/>
-              <a:t>Github</a:t>
-            </a:r>
-            <a:r>
-              <a:rPr lang="en-US" sz="1600" dirty="0"/>
-              <a:t> repository. It is recommended to clone your repo, then select it as your search dir.</a:t>
+              <a:t>This directory on your PC should contain the root of all your libraries that are in GitHub. The root should be the same as what is available on your GitHub repository. It is recommended to clone your repo, then select it as your search dir.</a:t>
             </a:r>
           </a:p>
           <a:p>
@@ -3698,7 +3674,7 @@
             </a:r>
             <a:r>
               <a:rPr lang="en-US" sz="1600" dirty="0"/>
-              <a:t>The final generated database .csv file will be created in this path.</a:t>
+              <a:t>The final generated database CSV file will be created in this path.</a:t>
             </a:r>
           </a:p>
           <a:p>
@@ -3709,23 +3685,7 @@
             </a:r>
             <a:r>
               <a:rPr lang="en-US" sz="1600" dirty="0"/>
-              <a:t>App uses this link to download from the </a:t>
-            </a:r>
-            <a:r>
-              <a:rPr lang="en-US" sz="1600" dirty="0" err="1"/>
-              <a:t>Github</a:t>
-            </a:r>
-            <a:r>
-              <a:rPr lang="en-US" sz="1600" dirty="0"/>
-              <a:t>, please set your </a:t>
-            </a:r>
-            <a:r>
-              <a:rPr lang="en-US" sz="1600" dirty="0" err="1"/>
-              <a:t>Github</a:t>
-            </a:r>
-            <a:r>
-              <a:rPr lang="en-US" sz="1600" dirty="0"/>
-              <a:t> repository path to here.</a:t>
+              <a:t>The app uses this link to download from GitHub, please set your GitHub repository path to here.</a:t>
             </a:r>
           </a:p>
           <a:p>
@@ -3745,23 +3705,7 @@
             <a:pPr algn="just"/>
             <a:r>
               <a:rPr lang="en-US" sz="1600" dirty="0"/>
-              <a:t>Make sure add the branch to the your </a:t>
-            </a:r>
-            <a:r>
-              <a:rPr lang="en-US" sz="1600" dirty="0" err="1"/>
-              <a:t>Github</a:t>
-            </a:r>
-            <a:r>
-              <a:rPr lang="en-US" sz="1600" dirty="0"/>
-              <a:t> </a:t>
-            </a:r>
-            <a:r>
-              <a:rPr lang="en-US" sz="1600" dirty="0" err="1"/>
-              <a:t>url</a:t>
-            </a:r>
-            <a:r>
-              <a:rPr lang="en-US" sz="1600" dirty="0"/>
-              <a:t> so the extension will be able to download the files in raw format.</a:t>
+              <a:t>Make sure to add the branch to your GitHub URL so the extension will be able to download the files in raw format.</a:t>
             </a:r>
           </a:p>
           <a:p>
@@ -3799,8 +3743,28 @@
             </a:r>
             <a:r>
               <a:rPr lang="en-US" sz="1600" dirty="0"/>
-              <a:t>You can limit the maximum number of libraries for search and generating the database.</a:t>
-            </a:r>
+              <a:t>You can limit the maximum number of libraries for searching and generating the database.</a:t>
+            </a:r>
+          </a:p>
+          <a:p>
+            <a:pPr algn="just"/>
+            <a:r>
+              <a:rPr lang="en-US" sz="1600" b="1" dirty="0"/>
+              <a:t>Params: </a:t>
+            </a:r>
+            <a:r>
+              <a:rPr lang="en-US" sz="1600" dirty="0"/>
+              <a:t>Select which parameters to be included on the DB file. Usually, these parameters exist on .</a:t>
+            </a:r>
+            <a:r>
+              <a:rPr lang="en-US" sz="1600" dirty="0" err="1"/>
+              <a:t>schlib</a:t>
+            </a:r>
+            <a:r>
+              <a:rPr lang="en-US" sz="1600" dirty="0"/>
+              <a:t> for symbols.</a:t>
+            </a:r>
+            <a:endParaRPr lang="en-US" sz="1600" b="1" dirty="0"/>
           </a:p>
           <a:p>
             <a:pPr algn="just"/>
@@ -3810,7 +3774,7 @@
             </a:r>
             <a:r>
               <a:rPr lang="en-US" sz="1600" dirty="0"/>
-              <a:t>This feature is not implemented yet, but it is intended to update the existing .csv file. So, only updates the changes on the csv database.</a:t>
+              <a:t>This feature has not yet been implemented, but it is intended to update the existing CSV file. So, only updates the changes on the CSV database.</a:t>
             </a:r>
           </a:p>
           <a:p>
@@ -3825,15 +3789,7 @@
             </a:r>
             <a:r>
               <a:rPr lang="en-US" sz="1600" dirty="0"/>
-              <a:t>. Wait until it is done. You can now add this file to your </a:t>
-            </a:r>
-            <a:r>
-              <a:rPr lang="en-US" sz="1600" dirty="0" err="1"/>
-              <a:t>Github</a:t>
-            </a:r>
-            <a:r>
-              <a:rPr lang="en-US" sz="1600" dirty="0"/>
-              <a:t>. So, others can use it on their Settings-&gt;DB URL, to download and use it directly.</a:t>
+              <a:t>. Wait until it is finished. You can now add this file to your GitHub. So, others can use it on their Settings-&gt;DB URL, to download and use it directly.</a:t>
             </a:r>
           </a:p>
         </p:txBody>
@@ -4131,7 +4087,7 @@
         </p:nvSpPr>
         <p:spPr>
           <a:xfrm>
-            <a:off x="529086" y="1974978"/>
+            <a:off x="490387" y="1975143"/>
             <a:ext cx="524213" cy="524213"/>
           </a:xfrm>
           <a:prstGeom prst="ellipse">
@@ -4231,7 +4187,7 @@
         </p:nvSpPr>
         <p:spPr>
           <a:xfrm>
-            <a:off x="495569" y="4126949"/>
+            <a:off x="490387" y="4063958"/>
             <a:ext cx="522017" cy="524213"/>
           </a:xfrm>
           <a:prstGeom prst="ellipse">
@@ -4290,7 +4246,7 @@
         </p:nvSpPr>
         <p:spPr>
           <a:xfrm>
-            <a:off x="529415" y="4887750"/>
+            <a:off x="499041" y="4840762"/>
             <a:ext cx="524213" cy="524213"/>
           </a:xfrm>
           <a:prstGeom prst="ellipse">
@@ -4394,7 +4350,7 @@
         </p:nvSpPr>
         <p:spPr>
           <a:xfrm>
-            <a:off x="550842" y="5891155"/>
+            <a:off x="499041" y="5829117"/>
             <a:ext cx="524213" cy="524213"/>
           </a:xfrm>
           <a:prstGeom prst="ellipse">
@@ -4497,7 +4453,7 @@
         </p:nvSpPr>
         <p:spPr>
           <a:xfrm>
-            <a:off x="528999" y="2730217"/>
+            <a:off x="492583" y="2727183"/>
             <a:ext cx="522017" cy="524213"/>
           </a:xfrm>
           <a:prstGeom prst="ellipse">
@@ -4603,7 +4559,7 @@
           <a:p>
             <a:r>
               <a:rPr lang="en-US" sz="1600" dirty="0"/>
-              <a:t>Add python to the Windows PATH during installation</a:t>
+              <a:t>Add Python to the Windows PATH during installation</a:t>
             </a:r>
           </a:p>
         </p:txBody>
@@ -4625,8 +4581,8 @@
         </p:nvCxnSpPr>
         <p:spPr>
           <a:xfrm rot="5400000">
-            <a:off x="4344109" y="5826697"/>
-            <a:ext cx="236546" cy="2337727"/>
+            <a:off x="4301748" y="5856685"/>
+            <a:ext cx="236547" cy="2253003"/>
           </a:xfrm>
           <a:prstGeom prst="bentConnector2">
             <a:avLst/>
@@ -4668,7 +4624,7 @@
         </p:nvSpPr>
         <p:spPr>
           <a:xfrm>
-            <a:off x="5369138" y="6353074"/>
+            <a:off x="5284415" y="6340700"/>
             <a:ext cx="524213" cy="524213"/>
           </a:xfrm>
           <a:prstGeom prst="ellipse">
@@ -4780,7 +4736,7 @@
         </p:nvSpPr>
         <p:spPr>
           <a:xfrm>
-            <a:off x="5304509" y="7537326"/>
+            <a:off x="5301615" y="7251771"/>
             <a:ext cx="524213" cy="524213"/>
           </a:xfrm>
           <a:prstGeom prst="ellipse">
@@ -4888,7 +4844,7 @@
         </p:nvSpPr>
         <p:spPr>
           <a:xfrm>
-            <a:off x="7934215" y="15117990"/>
+            <a:off x="7957438" y="14723747"/>
             <a:ext cx="1037276" cy="476615"/>
           </a:xfrm>
           <a:prstGeom prst="roundRect">
@@ -5048,8 +5004,8 @@
         </p:nvCxnSpPr>
         <p:spPr>
           <a:xfrm rot="16200000" flipH="1">
-            <a:off x="3103036" y="10525117"/>
-            <a:ext cx="7294759" cy="2367601"/>
+            <a:off x="3167545" y="10172161"/>
+            <a:ext cx="7186071" cy="2393716"/>
           </a:xfrm>
           <a:prstGeom prst="bentConnector2">
             <a:avLst/>
@@ -5288,7 +5244,7 @@
         </p:nvSpPr>
         <p:spPr>
           <a:xfrm>
-            <a:off x="5284415" y="16140475"/>
+            <a:off x="5327882" y="15254443"/>
             <a:ext cx="524213" cy="524213"/>
           </a:xfrm>
           <a:prstGeom prst="ellipse">
@@ -5348,8 +5304,8 @@
         </p:nvCxnSpPr>
         <p:spPr>
           <a:xfrm rot="5400000">
-            <a:off x="2649744" y="17963162"/>
-            <a:ext cx="4195252" cy="1598304"/>
+            <a:off x="2228462" y="17498413"/>
+            <a:ext cx="5081284" cy="1641771"/>
           </a:xfrm>
           <a:prstGeom prst="bentConnector2">
             <a:avLst/>
@@ -5530,34 +5486,46 @@
           <a:lstStyle/>
           <a:p>
             <a:r>
-              <a:rPr lang="en-US" sz="2000" dirty="0"/>
+              <a:rPr lang="en-US" sz="2000" dirty="0">
+                <a:solidFill>
+                  <a:schemeClr val="tx1"/>
+                </a:solidFill>
+              </a:rPr>
               <a:t>What is </a:t>
             </a:r>
             <a:r>
-              <a:rPr lang="en-US" sz="2000" dirty="0" err="1"/>
+              <a:rPr lang="en-US" sz="2000" dirty="0" err="1">
+                <a:solidFill>
+                  <a:schemeClr val="tx1"/>
+                </a:solidFill>
+              </a:rPr>
               <a:t>CloudParts</a:t>
             </a:r>
             <a:r>
-              <a:rPr lang="en-US" sz="2000" dirty="0"/>
-              <a:t>:</a:t>
-            </a:r>
-          </a:p>
-          <a:p>
-            <a:r>
-              <a:rPr lang="en-US" sz="2000" dirty="0" err="1"/>
-              <a:t>CouldParts</a:t>
-            </a:r>
-            <a:r>
-              <a:rPr lang="en-US" sz="2000" dirty="0"/>
-              <a:t> is an Open source extension for Altium Designer in which you can search and place components directly from a </a:t>
-            </a:r>
-            <a:r>
-              <a:rPr lang="en-US" sz="2000" dirty="0" err="1"/>
-              <a:t>Github</a:t>
-            </a:r>
-            <a:r>
-              <a:rPr lang="en-US" sz="2000" dirty="0"/>
-              <a:t> repository without initially downloading all libraries and installing them. Hence, by having a database csv file from them you can search, then place them directly inside Altium.</a:t>
+              <a:rPr lang="en-US" sz="2000" dirty="0">
+                <a:solidFill>
+                  <a:schemeClr val="tx1"/>
+                </a:solidFill>
+              </a:rPr>
+              <a:t>?</a:t>
+            </a:r>
+          </a:p>
+          <a:p>
+            <a:r>
+              <a:rPr lang="en-US" sz="2000" dirty="0" err="1">
+                <a:solidFill>
+                  <a:schemeClr val="tx1"/>
+                </a:solidFill>
+              </a:rPr>
+              <a:t>CloudParts</a:t>
+            </a:r>
+            <a:r>
+              <a:rPr lang="en-US" sz="2000" dirty="0">
+                <a:solidFill>
+                  <a:schemeClr val="tx1"/>
+                </a:solidFill>
+              </a:rPr>
+              <a:t> is an open-source extension for Altium Designer that allows you to search for and place components directly from a GitHub repository—without the need to download and install entire libraries upfront. Instead, by using a CSV database file, you can efficiently search for components and place them directly within Altium Designer.</a:t>
             </a:r>
           </a:p>
         </p:txBody>

</xml_diff>